<commit_message>
updated presentation. Re-recorded slide #1 of Technical approach, and recorded slides for close range results
</commit_message>
<xml_diff>
--- a/presentation/cs231a_project.pptx
+++ b/presentation/cs231a_project.pptx
@@ -5490,13 +5490,77 @@
           </p:txBody>
         </p:sp>
       </p:grpSp>
+      <p:sp>
+        <p:nvSpPr>
+          <p:cNvPr id="41" name="TextBox 40">
+            <a:extLst>
+              <a:ext uri="{FF2B5EF4-FFF2-40B4-BE49-F238E27FC236}">
+                <a16:creationId xmlns:a16="http://schemas.microsoft.com/office/drawing/2014/main" id="{0FD2C362-14C4-423F-9B6F-617A06DC1EB4}"/>
+              </a:ext>
+            </a:extLst>
+          </p:cNvPr>
+          <p:cNvSpPr txBox="1"/>
+          <p:nvPr/>
+        </p:nvSpPr>
+        <p:spPr>
+          <a:xfrm>
+            <a:off x="7672469" y="1328015"/>
+            <a:ext cx="4578836" cy="430887"/>
+          </a:xfrm>
+          <a:prstGeom prst="rect">
+            <a:avLst/>
+          </a:prstGeom>
+          <a:noFill/>
+        </p:spPr>
+        <p:txBody>
+          <a:bodyPr wrap="square">
+            <a:spAutoFit/>
+          </a:bodyPr>
+          <a:lstStyle/>
+          <a:p>
+            <a:pPr algn="ctr"/>
+            <a:r>
+              <a:rPr lang="en-US" sz="1100" b="0" i="1" u="none" strike="noStrike" baseline="0" dirty="0">
+                <a:solidFill>
+                  <a:schemeClr val="accent1">
+                    <a:lumMod val="75000"/>
+                  </a:schemeClr>
+                </a:solidFill>
+                <a:latin typeface="NimbusRomNo9L-Medi"/>
+              </a:rPr>
+              <a:t>“Forget the checkerboard: practical self-calibration using a planar scene”</a:t>
+            </a:r>
+          </a:p>
+          <a:p>
+            <a:pPr algn="ctr"/>
+            <a:r>
+              <a:rPr lang="en-US" sz="1100" i="1" dirty="0">
+                <a:solidFill>
+                  <a:schemeClr val="accent1">
+                    <a:lumMod val="75000"/>
+                  </a:schemeClr>
+                </a:solidFill>
+                <a:latin typeface="NimbusRomNo9L-Medi"/>
+              </a:rPr>
+              <a:t>Herrera et. Al, WACV 2016 </a:t>
+            </a:r>
+            <a:endParaRPr lang="en-US" sz="1100" i="1" dirty="0">
+              <a:solidFill>
+                <a:schemeClr val="accent1">
+                  <a:lumMod val="75000"/>
+                </a:schemeClr>
+              </a:solidFill>
+            </a:endParaRPr>
+          </a:p>
+        </p:txBody>
+      </p:sp>
       <p:pic>
         <p:nvPicPr>
-          <p:cNvPr id="104" name="Audio 103">
+          <p:cNvPr id="15" name="Audio 14">
             <a:hlinkClick r:id="" action="ppaction://media"/>
             <a:extLst>
               <a:ext uri="{FF2B5EF4-FFF2-40B4-BE49-F238E27FC236}">
-                <a16:creationId xmlns:a16="http://schemas.microsoft.com/office/drawing/2014/main" id="{4C126C96-03A6-4E92-9981-20A1DD0814C6}"/>
+                <a16:creationId xmlns:a16="http://schemas.microsoft.com/office/drawing/2014/main" id="{55FC6B44-70F0-4257-B2A9-A57F3579AD0B}"/>
               </a:ext>
             </a:extLst>
           </p:cNvPr>
@@ -5528,70 +5592,6 @@
           </a:prstGeom>
         </p:spPr>
       </p:pic>
-      <p:sp>
-        <p:nvSpPr>
-          <p:cNvPr id="41" name="TextBox 40">
-            <a:extLst>
-              <a:ext uri="{FF2B5EF4-FFF2-40B4-BE49-F238E27FC236}">
-                <a16:creationId xmlns:a16="http://schemas.microsoft.com/office/drawing/2014/main" id="{0FD2C362-14C4-423F-9B6F-617A06DC1EB4}"/>
-              </a:ext>
-            </a:extLst>
-          </p:cNvPr>
-          <p:cNvSpPr txBox="1"/>
-          <p:nvPr/>
-        </p:nvSpPr>
-        <p:spPr>
-          <a:xfrm>
-            <a:off x="7672469" y="1328015"/>
-            <a:ext cx="4578836" cy="430887"/>
-          </a:xfrm>
-          <a:prstGeom prst="rect">
-            <a:avLst/>
-          </a:prstGeom>
-          <a:noFill/>
-        </p:spPr>
-        <p:txBody>
-          <a:bodyPr wrap="square">
-            <a:spAutoFit/>
-          </a:bodyPr>
-          <a:lstStyle/>
-          <a:p>
-            <a:pPr algn="ctr"/>
-            <a:r>
-              <a:rPr lang="en-US" sz="1100" b="0" i="1" u="none" strike="noStrike" baseline="0" dirty="0">
-                <a:solidFill>
-                  <a:schemeClr val="accent1">
-                    <a:lumMod val="75000"/>
-                  </a:schemeClr>
-                </a:solidFill>
-                <a:latin typeface="NimbusRomNo9L-Medi"/>
-              </a:rPr>
-              <a:t>“Forget the checkerboard: practical self-calibration using a planar scene”</a:t>
-            </a:r>
-          </a:p>
-          <a:p>
-            <a:pPr algn="ctr"/>
-            <a:r>
-              <a:rPr lang="en-US" sz="1100" i="1" dirty="0">
-                <a:solidFill>
-                  <a:schemeClr val="accent1">
-                    <a:lumMod val="75000"/>
-                  </a:schemeClr>
-                </a:solidFill>
-                <a:latin typeface="NimbusRomNo9L-Medi"/>
-              </a:rPr>
-              <a:t>Herrera et. Al, WACV 2016 </a:t>
-            </a:r>
-            <a:endParaRPr lang="en-US" sz="1100" i="1" dirty="0">
-              <a:solidFill>
-                <a:schemeClr val="accent1">
-                  <a:lumMod val="75000"/>
-                </a:schemeClr>
-              </a:solidFill>
-            </a:endParaRPr>
-          </a:p>
-        </p:txBody>
-      </p:sp>
     </p:spTree>
     <p:custDataLst>
       <p:tags r:id="rId1"/>
@@ -5605,12 +5605,12 @@
   <p:clrMapOvr>
     <a:masterClrMapping/>
   </p:clrMapOvr>
-  <mc:AlternateContent xmlns:mc="http://schemas.openxmlformats.org/markup-compatibility/2006" xmlns:p14="http://schemas.microsoft.com/office/powerpoint/2010/main">
-    <mc:Choice Requires="p14">
-      <p:transition spd="slow" p14:dur="2000" advTm="48597"/>
+  <mc:AlternateContent xmlns:mc="http://schemas.openxmlformats.org/markup-compatibility/2006">
+    <mc:Choice xmlns:p14="http://schemas.microsoft.com/office/powerpoint/2010/main" Requires="p14">
+      <p:transition spd="slow" p14:dur="2000" advTm="46692"/>
     </mc:Choice>
-    <mc:Fallback xmlns="">
-      <p:transition spd="slow" advTm="48597"/>
+    <mc:Fallback>
+      <p:transition spd="slow" advTm="46692"/>
     </mc:Fallback>
   </mc:AlternateContent>
   <p:timing>
@@ -5646,7 +5646,7 @@
                                       <p:cBhvr>
                                         <p:cTn id="6" dur="1" fill="hold"/>
                                         <p:tgtEl>
-                                          <p:spTgt spid="104"/>
+                                          <p:spTgt spid="15"/>
                                         </p:tgtEl>
                                       </p:cBhvr>
                                     </p:cmd>
@@ -5672,7 +5672,7 @@
                             </p:stCondLst>
                             <p:childTnLst>
                               <p:par>
-                                <p:cTn id="9" presetID="53" presetClass="entr" presetSubtype="16" fill="hold" nodeType="clickEffect">
+                                <p:cTn id="9" presetID="1" presetClass="entr" presetSubtype="0" fill="hold" grpId="0" nodeType="clickEffect">
                                   <p:stCondLst>
                                     <p:cond delay="0"/>
                                   </p:stCondLst>
@@ -5680,6 +5680,96 @@
                                     <p:set>
                                       <p:cBhvr>
                                         <p:cTn id="10" dur="1" fill="hold">
+                                          <p:stCondLst>
+                                            <p:cond delay="0"/>
+                                          </p:stCondLst>
+                                        </p:cTn>
+                                        <p:tgtEl>
+                                          <p:spTgt spid="41"/>
+                                        </p:tgtEl>
+                                        <p:attrNameLst>
+                                          <p:attrName>style.visibility</p:attrName>
+                                        </p:attrNameLst>
+                                      </p:cBhvr>
+                                      <p:to>
+                                        <p:strVal val="visible"/>
+                                      </p:to>
+                                    </p:set>
+                                  </p:childTnLst>
+                                </p:cTn>
+                              </p:par>
+                            </p:childTnLst>
+                          </p:cTn>
+                        </p:par>
+                      </p:childTnLst>
+                    </p:cTn>
+                  </p:par>
+                  <p:par>
+                    <p:cTn id="11" fill="hold">
+                      <p:stCondLst>
+                        <p:cond delay="indefinite"/>
+                      </p:stCondLst>
+                      <p:childTnLst>
+                        <p:par>
+                          <p:cTn id="12" fill="hold">
+                            <p:stCondLst>
+                              <p:cond delay="0"/>
+                            </p:stCondLst>
+                            <p:childTnLst>
+                              <p:par>
+                                <p:cTn id="13" presetID="1" presetClass="entr" presetSubtype="0" fill="hold" nodeType="clickEffect">
+                                  <p:stCondLst>
+                                    <p:cond delay="0"/>
+                                  </p:stCondLst>
+                                  <p:childTnLst>
+                                    <p:set>
+                                      <p:cBhvr>
+                                        <p:cTn id="14" dur="1" fill="hold">
+                                          <p:stCondLst>
+                                            <p:cond delay="0"/>
+                                          </p:stCondLst>
+                                        </p:cTn>
+                                        <p:tgtEl>
+                                          <p:spTgt spid="100"/>
+                                        </p:tgtEl>
+                                        <p:attrNameLst>
+                                          <p:attrName>style.visibility</p:attrName>
+                                        </p:attrNameLst>
+                                      </p:cBhvr>
+                                      <p:to>
+                                        <p:strVal val="visible"/>
+                                      </p:to>
+                                    </p:set>
+                                  </p:childTnLst>
+                                </p:cTn>
+                              </p:par>
+                            </p:childTnLst>
+                          </p:cTn>
+                        </p:par>
+                      </p:childTnLst>
+                    </p:cTn>
+                  </p:par>
+                  <p:par>
+                    <p:cTn id="15" fill="hold">
+                      <p:stCondLst>
+                        <p:cond delay="indefinite"/>
+                      </p:stCondLst>
+                      <p:childTnLst>
+                        <p:par>
+                          <p:cTn id="16" fill="hold">
+                            <p:stCondLst>
+                              <p:cond delay="0"/>
+                            </p:stCondLst>
+                            <p:childTnLst>
+                              <p:par>
+                                <p:cTn id="17" presetID="53" presetClass="entr" presetSubtype="16" fill="hold" nodeType="clickEffect">
+                                  <p:stCondLst>
+                                    <p:cond delay="0"/>
+                                  </p:stCondLst>
+                                  <p:childTnLst>
+                                    <p:set>
+                                      <p:cBhvr>
+                                        <p:cTn id="18" dur="1" fill="hold">
                                           <p:stCondLst>
                                             <p:cond delay="0"/>
                                           </p:stCondLst>
@@ -5697,7 +5787,7 @@
                                     </p:set>
                                     <p:anim calcmode="lin" valueType="num">
                                       <p:cBhvr>
-                                        <p:cTn id="11" dur="500" fill="hold"/>
+                                        <p:cTn id="19" dur="500" fill="hold"/>
                                         <p:tgtEl>
                                           <p:spTgt spid="101"/>
                                         </p:tgtEl>
@@ -5720,7 +5810,7 @@
                                     </p:anim>
                                     <p:anim calcmode="lin" valueType="num">
                                       <p:cBhvr>
-                                        <p:cTn id="12" dur="500" fill="hold"/>
+                                        <p:cTn id="20" dur="500" fill="hold"/>
                                         <p:tgtEl>
                                           <p:spTgt spid="101"/>
                                         </p:tgtEl>
@@ -5743,7 +5833,7 @@
                                     </p:anim>
                                     <p:animEffect transition="in" filter="fade">
                                       <p:cBhvr>
-                                        <p:cTn id="13" dur="500"/>
+                                        <p:cTn id="21" dur="500"/>
                                         <p:tgtEl>
                                           <p:spTgt spid="101"/>
                                         </p:tgtEl>
@@ -5759,26 +5849,26 @@
                     </p:cTn>
                   </p:par>
                   <p:par>
-                    <p:cTn id="14" fill="hold">
+                    <p:cTn id="22" fill="hold">
                       <p:stCondLst>
                         <p:cond delay="indefinite"/>
                       </p:stCondLst>
                       <p:childTnLst>
                         <p:par>
-                          <p:cTn id="15" fill="hold">
+                          <p:cTn id="23" fill="hold">
                             <p:stCondLst>
                               <p:cond delay="0"/>
                             </p:stCondLst>
                             <p:childTnLst>
                               <p:par>
-                                <p:cTn id="16" presetID="53" presetClass="entr" presetSubtype="16" fill="hold" nodeType="clickEffect">
+                                <p:cTn id="24" presetID="53" presetClass="entr" presetSubtype="16" fill="hold" nodeType="clickEffect">
                                   <p:stCondLst>
                                     <p:cond delay="0"/>
                                   </p:stCondLst>
                                   <p:childTnLst>
                                     <p:set>
                                       <p:cBhvr>
-                                        <p:cTn id="17" dur="1" fill="hold">
+                                        <p:cTn id="25" dur="1" fill="hold">
                                           <p:stCondLst>
                                             <p:cond delay="0"/>
                                           </p:stCondLst>
@@ -5796,7 +5886,7 @@
                                     </p:set>
                                     <p:anim calcmode="lin" valueType="num">
                                       <p:cBhvr>
-                                        <p:cTn id="18" dur="500" fill="hold"/>
+                                        <p:cTn id="26" dur="500" fill="hold"/>
                                         <p:tgtEl>
                                           <p:spTgt spid="102"/>
                                         </p:tgtEl>
@@ -5819,7 +5909,7 @@
                                     </p:anim>
                                     <p:anim calcmode="lin" valueType="num">
                                       <p:cBhvr>
-                                        <p:cTn id="19" dur="500" fill="hold"/>
+                                        <p:cTn id="27" dur="500" fill="hold"/>
                                         <p:tgtEl>
                                           <p:spTgt spid="102"/>
                                         </p:tgtEl>
@@ -5842,7 +5932,7 @@
                                     </p:anim>
                                     <p:animEffect transition="in" filter="fade">
                                       <p:cBhvr>
-                                        <p:cTn id="20" dur="500"/>
+                                        <p:cTn id="28" dur="500"/>
                                         <p:tgtEl>
                                           <p:spTgt spid="102"/>
                                         </p:tgtEl>
@@ -5858,26 +5948,26 @@
                     </p:cTn>
                   </p:par>
                   <p:par>
-                    <p:cTn id="21" fill="hold">
+                    <p:cTn id="29" fill="hold">
                       <p:stCondLst>
                         <p:cond delay="indefinite"/>
                       </p:stCondLst>
                       <p:childTnLst>
                         <p:par>
-                          <p:cTn id="22" fill="hold">
+                          <p:cTn id="30" fill="hold">
                             <p:stCondLst>
                               <p:cond delay="0"/>
                             </p:stCondLst>
                             <p:childTnLst>
                               <p:par>
-                                <p:cTn id="23" presetID="53" presetClass="entr" presetSubtype="16" fill="hold" nodeType="clickEffect">
+                                <p:cTn id="31" presetID="53" presetClass="entr" presetSubtype="16" fill="hold" nodeType="clickEffect">
                                   <p:stCondLst>
                                     <p:cond delay="0"/>
                                   </p:stCondLst>
                                   <p:childTnLst>
                                     <p:set>
                                       <p:cBhvr>
-                                        <p:cTn id="24" dur="1" fill="hold">
+                                        <p:cTn id="32" dur="1" fill="hold">
                                           <p:stCondLst>
                                             <p:cond delay="0"/>
                                           </p:stCondLst>
@@ -5895,7 +5985,7 @@
                                     </p:set>
                                     <p:anim calcmode="lin" valueType="num">
                                       <p:cBhvr>
-                                        <p:cTn id="25" dur="500" fill="hold"/>
+                                        <p:cTn id="33" dur="500" fill="hold"/>
                                         <p:tgtEl>
                                           <p:spTgt spid="103"/>
                                         </p:tgtEl>
@@ -5918,7 +6008,7 @@
                                     </p:anim>
                                     <p:anim calcmode="lin" valueType="num">
                                       <p:cBhvr>
-                                        <p:cTn id="26" dur="500" fill="hold"/>
+                                        <p:cTn id="34" dur="500" fill="hold"/>
                                         <p:tgtEl>
                                           <p:spTgt spid="103"/>
                                         </p:tgtEl>
@@ -5941,7 +6031,7 @@
                                     </p:anim>
                                     <p:animEffect transition="in" filter="fade">
                                       <p:cBhvr>
-                                        <p:cTn id="27" dur="500"/>
+                                        <p:cTn id="35" dur="500"/>
                                         <p:tgtEl>
                                           <p:spTgt spid="103"/>
                                         </p:tgtEl>
@@ -5975,7 +6065,7 @@
             </p:seq>
             <p:audio isNarration="1">
               <p:cMediaNode vol="80000" showWhenStopped="0">
-                <p:cTn id="28" fill="hold" display="0">
+                <p:cTn id="36" fill="hold" display="0">
                   <p:stCondLst>
                     <p:cond delay="indefinite"/>
                   </p:stCondLst>
@@ -5988,7 +6078,7 @@
                   </p:endCondLst>
                 </p:cTn>
                 <p:tgtEl>
-                  <p:spTgt spid="104"/>
+                  <p:spTgt spid="15"/>
                 </p:tgtEl>
               </p:cMediaNode>
             </p:audio>
@@ -5996,6 +6086,9 @@
         </p:cTn>
       </p:par>
     </p:tnLst>
+    <p:bldLst>
+      <p:bldP spid="41" grpId="0"/>
+    </p:bldLst>
   </p:timing>
 </p:sld>
 </file>
@@ -6032,7 +6125,7 @@
           <p:nvPr/>
         </p:nvPicPr>
         <p:blipFill>
-          <a:blip r:embed="rId2"/>
+          <a:blip r:embed="rId5"/>
           <a:stretch>
             <a:fillRect/>
           </a:stretch>
@@ -6125,7 +6218,7 @@
           <p:nvPr/>
         </p:nvPicPr>
         <p:blipFill>
-          <a:blip r:embed="rId3">
+          <a:blip r:embed="rId6">
             <a:extLst>
               <a:ext uri="{28A0092B-C50C-407E-A947-70E740481C1C}">
                 <a14:useLocalDpi xmlns:a14="http://schemas.microsoft.com/office/drawing/2010/main" val="0"/>
@@ -6608,7 +6701,7 @@
                 <p:nvPr/>
               </p:nvPicPr>
               <p:blipFill>
-                <a:blip r:embed="rId4">
+                <a:blip r:embed="rId7">
                   <a:extLst>
                     <a:ext uri="{28A0092B-C50C-407E-A947-70E740481C1C}">
                       <a14:useLocalDpi xmlns:a14="http://schemas.microsoft.com/office/drawing/2010/main" val="0"/>
@@ -7188,7 +7281,48 @@
           </a:fontRef>
         </p:style>
       </p:cxnSp>
+      <p:pic>
+        <p:nvPicPr>
+          <p:cNvPr id="13" name="Audio 12">
+            <a:hlinkClick r:id="" action="ppaction://media"/>
+            <a:extLst>
+              <a:ext uri="{FF2B5EF4-FFF2-40B4-BE49-F238E27FC236}">
+                <a16:creationId xmlns:a16="http://schemas.microsoft.com/office/drawing/2014/main" id="{4846310A-2CC7-492B-BFF8-5320465505F2}"/>
+              </a:ext>
+            </a:extLst>
+          </p:cNvPr>
+          <p:cNvPicPr>
+            <a:picLocks noChangeAspect="1"/>
+          </p:cNvPicPr>
+          <p:nvPr>
+            <a:audioFile r:link="rId3"/>
+            <p:extLst>
+              <p:ext uri="{DAA4B4D4-6D71-4841-9C94-3DE7FCFB9230}">
+                <p14:media xmlns:p14="http://schemas.microsoft.com/office/powerpoint/2010/main" r:embed="rId2"/>
+              </p:ext>
+            </p:extLst>
+          </p:nvPr>
+        </p:nvPicPr>
+        <p:blipFill>
+          <a:blip r:embed="rId8"/>
+          <a:stretch>
+            <a:fillRect/>
+          </a:stretch>
+        </p:blipFill>
+        <p:spPr>
+          <a:xfrm>
+            <a:off x="11691938" y="6357938"/>
+            <a:ext cx="347662" cy="347662"/>
+          </a:xfrm>
+          <a:prstGeom prst="rect">
+            <a:avLst/>
+          </a:prstGeom>
+        </p:spPr>
+      </p:pic>
     </p:spTree>
+    <p:custDataLst>
+      <p:tags r:id="rId1"/>
+    </p:custDataLst>
     <p:extLst>
       <p:ext uri="{BB962C8B-B14F-4D97-AF65-F5344CB8AC3E}">
         <p14:creationId xmlns:p14="http://schemas.microsoft.com/office/powerpoint/2010/main" val="4125605247"/>
@@ -7198,6 +7332,599 @@
   <p:clrMapOvr>
     <a:masterClrMapping/>
   </p:clrMapOvr>
+  <mc:AlternateContent xmlns:mc="http://schemas.openxmlformats.org/markup-compatibility/2006">
+    <mc:Choice xmlns:p14="http://schemas.microsoft.com/office/powerpoint/2010/main" Requires="p14">
+      <p:transition spd="slow" p14:dur="2000" advTm="14011"/>
+    </mc:Choice>
+    <mc:Fallback>
+      <p:transition spd="slow" advTm="14011"/>
+    </mc:Fallback>
+  </mc:AlternateContent>
+  <p:timing>
+    <p:tnLst>
+      <p:par>
+        <p:cTn id="1" dur="indefinite" restart="never" nodeType="tmRoot">
+          <p:childTnLst>
+            <p:seq concurrent="1" nextAc="seek">
+              <p:cTn id="2" dur="indefinite" nodeType="mainSeq">
+                <p:childTnLst>
+                  <p:par>
+                    <p:cTn id="3" fill="hold">
+                      <p:stCondLst>
+                        <p:cond delay="indefinite"/>
+                        <p:cond evt="onBegin" delay="0">
+                          <p:tn val="2"/>
+                        </p:cond>
+                      </p:stCondLst>
+                      <p:childTnLst>
+                        <p:par>
+                          <p:cTn id="4" fill="hold">
+                            <p:stCondLst>
+                              <p:cond delay="0"/>
+                            </p:stCondLst>
+                            <p:childTnLst>
+                              <p:par>
+                                <p:cTn id="5" presetID="1" presetClass="mediacall" presetSubtype="0" fill="hold" nodeType="afterEffect">
+                                  <p:stCondLst>
+                                    <p:cond delay="0"/>
+                                  </p:stCondLst>
+                                  <p:childTnLst>
+                                    <p:cmd type="call" cmd="playFrom(0.0)">
+                                      <p:cBhvr>
+                                        <p:cTn id="6" dur="1" fill="hold"/>
+                                        <p:tgtEl>
+                                          <p:spTgt spid="13"/>
+                                        </p:tgtEl>
+                                      </p:cBhvr>
+                                    </p:cmd>
+                                  </p:childTnLst>
+                                </p:cTn>
+                              </p:par>
+                            </p:childTnLst>
+                          </p:cTn>
+                        </p:par>
+                      </p:childTnLst>
+                    </p:cTn>
+                  </p:par>
+                  <p:par>
+                    <p:cTn id="7" fill="hold">
+                      <p:stCondLst>
+                        <p:cond delay="indefinite"/>
+                      </p:stCondLst>
+                      <p:childTnLst>
+                        <p:par>
+                          <p:cTn id="8" fill="hold">
+                            <p:stCondLst>
+                              <p:cond delay="0"/>
+                            </p:stCondLst>
+                            <p:childTnLst>
+                              <p:par>
+                                <p:cTn id="9" presetID="10" presetClass="entr" presetSubtype="0" fill="hold" grpId="0" nodeType="clickEffect">
+                                  <p:stCondLst>
+                                    <p:cond delay="0"/>
+                                  </p:stCondLst>
+                                  <p:childTnLst>
+                                    <p:set>
+                                      <p:cBhvr>
+                                        <p:cTn id="10" dur="1" fill="hold">
+                                          <p:stCondLst>
+                                            <p:cond delay="0"/>
+                                          </p:stCondLst>
+                                        </p:cTn>
+                                        <p:tgtEl>
+                                          <p:spTgt spid="9"/>
+                                        </p:tgtEl>
+                                        <p:attrNameLst>
+                                          <p:attrName>style.visibility</p:attrName>
+                                        </p:attrNameLst>
+                                      </p:cBhvr>
+                                      <p:to>
+                                        <p:strVal val="visible"/>
+                                      </p:to>
+                                    </p:set>
+                                    <p:animEffect transition="in" filter="fade">
+                                      <p:cBhvr>
+                                        <p:cTn id="11" dur="500"/>
+                                        <p:tgtEl>
+                                          <p:spTgt spid="9"/>
+                                        </p:tgtEl>
+                                      </p:cBhvr>
+                                    </p:animEffect>
+                                  </p:childTnLst>
+                                </p:cTn>
+                              </p:par>
+                            </p:childTnLst>
+                          </p:cTn>
+                        </p:par>
+                      </p:childTnLst>
+                    </p:cTn>
+                  </p:par>
+                  <p:par>
+                    <p:cTn id="12" fill="hold">
+                      <p:stCondLst>
+                        <p:cond delay="indefinite"/>
+                      </p:stCondLst>
+                      <p:childTnLst>
+                        <p:par>
+                          <p:cTn id="13" fill="hold">
+                            <p:stCondLst>
+                              <p:cond delay="0"/>
+                            </p:stCondLst>
+                            <p:childTnLst>
+                              <p:par>
+                                <p:cTn id="14" presetID="1" presetClass="entr" presetSubtype="0" fill="hold" grpId="0" nodeType="clickEffect">
+                                  <p:stCondLst>
+                                    <p:cond delay="0"/>
+                                  </p:stCondLst>
+                                  <p:childTnLst>
+                                    <p:set>
+                                      <p:cBhvr>
+                                        <p:cTn id="15" dur="1" fill="hold">
+                                          <p:stCondLst>
+                                            <p:cond delay="0"/>
+                                          </p:stCondLst>
+                                        </p:cTn>
+                                        <p:tgtEl>
+                                          <p:spTgt spid="16"/>
+                                        </p:tgtEl>
+                                        <p:attrNameLst>
+                                          <p:attrName>style.visibility</p:attrName>
+                                        </p:attrNameLst>
+                                      </p:cBhvr>
+                                      <p:to>
+                                        <p:strVal val="visible"/>
+                                      </p:to>
+                                    </p:set>
+                                  </p:childTnLst>
+                                </p:cTn>
+                              </p:par>
+                              <p:par>
+                                <p:cTn id="16" presetID="1" presetClass="entr" presetSubtype="0" fill="hold" nodeType="withEffect">
+                                  <p:stCondLst>
+                                    <p:cond delay="0"/>
+                                  </p:stCondLst>
+                                  <p:childTnLst>
+                                    <p:set>
+                                      <p:cBhvr>
+                                        <p:cTn id="17" dur="1" fill="hold">
+                                          <p:stCondLst>
+                                            <p:cond delay="0"/>
+                                          </p:stCondLst>
+                                        </p:cTn>
+                                        <p:tgtEl>
+                                          <p:spTgt spid="6"/>
+                                        </p:tgtEl>
+                                        <p:attrNameLst>
+                                          <p:attrName>style.visibility</p:attrName>
+                                        </p:attrNameLst>
+                                      </p:cBhvr>
+                                      <p:to>
+                                        <p:strVal val="visible"/>
+                                      </p:to>
+                                    </p:set>
+                                  </p:childTnLst>
+                                </p:cTn>
+                              </p:par>
+                            </p:childTnLst>
+                          </p:cTn>
+                        </p:par>
+                      </p:childTnLst>
+                    </p:cTn>
+                  </p:par>
+                  <p:par>
+                    <p:cTn id="18" fill="hold">
+                      <p:stCondLst>
+                        <p:cond delay="indefinite"/>
+                      </p:stCondLst>
+                      <p:childTnLst>
+                        <p:par>
+                          <p:cTn id="19" fill="hold">
+                            <p:stCondLst>
+                              <p:cond delay="0"/>
+                            </p:stCondLst>
+                            <p:childTnLst>
+                              <p:par>
+                                <p:cTn id="20" presetID="1" presetClass="entr" presetSubtype="0" fill="hold" grpId="0" nodeType="clickEffect">
+                                  <p:stCondLst>
+                                    <p:cond delay="0"/>
+                                  </p:stCondLst>
+                                  <p:childTnLst>
+                                    <p:set>
+                                      <p:cBhvr>
+                                        <p:cTn id="21" dur="1" fill="hold">
+                                          <p:stCondLst>
+                                            <p:cond delay="0"/>
+                                          </p:stCondLst>
+                                        </p:cTn>
+                                        <p:tgtEl>
+                                          <p:spTgt spid="29"/>
+                                        </p:tgtEl>
+                                        <p:attrNameLst>
+                                          <p:attrName>style.visibility</p:attrName>
+                                        </p:attrNameLst>
+                                      </p:cBhvr>
+                                      <p:to>
+                                        <p:strVal val="visible"/>
+                                      </p:to>
+                                    </p:set>
+                                  </p:childTnLst>
+                                </p:cTn>
+                              </p:par>
+                            </p:childTnLst>
+                          </p:cTn>
+                        </p:par>
+                      </p:childTnLst>
+                    </p:cTn>
+                  </p:par>
+                  <p:par>
+                    <p:cTn id="22" fill="hold">
+                      <p:stCondLst>
+                        <p:cond delay="indefinite"/>
+                      </p:stCondLst>
+                      <p:childTnLst>
+                        <p:par>
+                          <p:cTn id="23" fill="hold">
+                            <p:stCondLst>
+                              <p:cond delay="0"/>
+                            </p:stCondLst>
+                            <p:childTnLst>
+                              <p:par>
+                                <p:cTn id="24" presetID="1" presetClass="entr" presetSubtype="0" fill="hold" grpId="0" nodeType="clickEffect">
+                                  <p:stCondLst>
+                                    <p:cond delay="0"/>
+                                  </p:stCondLst>
+                                  <p:childTnLst>
+                                    <p:set>
+                                      <p:cBhvr>
+                                        <p:cTn id="25" dur="1" fill="hold">
+                                          <p:stCondLst>
+                                            <p:cond delay="0"/>
+                                          </p:stCondLst>
+                                        </p:cTn>
+                                        <p:tgtEl>
+                                          <p:spTgt spid="10"/>
+                                        </p:tgtEl>
+                                        <p:attrNameLst>
+                                          <p:attrName>style.visibility</p:attrName>
+                                        </p:attrNameLst>
+                                      </p:cBhvr>
+                                      <p:to>
+                                        <p:strVal val="visible"/>
+                                      </p:to>
+                                    </p:set>
+                                  </p:childTnLst>
+                                </p:cTn>
+                              </p:par>
+                              <p:par>
+                                <p:cTn id="26" presetID="1" presetClass="entr" presetSubtype="0" fill="hold" grpId="0" nodeType="withEffect">
+                                  <p:stCondLst>
+                                    <p:cond delay="0"/>
+                                  </p:stCondLst>
+                                  <p:childTnLst>
+                                    <p:set>
+                                      <p:cBhvr>
+                                        <p:cTn id="27" dur="1" fill="hold">
+                                          <p:stCondLst>
+                                            <p:cond delay="0"/>
+                                          </p:stCondLst>
+                                        </p:cTn>
+                                        <p:tgtEl>
+                                          <p:spTgt spid="24"/>
+                                        </p:tgtEl>
+                                        <p:attrNameLst>
+                                          <p:attrName>style.visibility</p:attrName>
+                                        </p:attrNameLst>
+                                      </p:cBhvr>
+                                      <p:to>
+                                        <p:strVal val="visible"/>
+                                      </p:to>
+                                    </p:set>
+                                  </p:childTnLst>
+                                </p:cTn>
+                              </p:par>
+                              <p:par>
+                                <p:cTn id="28" presetID="1" presetClass="entr" presetSubtype="0" fill="hold" nodeType="withEffect">
+                                  <p:stCondLst>
+                                    <p:cond delay="0"/>
+                                  </p:stCondLst>
+                                  <p:childTnLst>
+                                    <p:set>
+                                      <p:cBhvr>
+                                        <p:cTn id="29" dur="1" fill="hold">
+                                          <p:stCondLst>
+                                            <p:cond delay="0"/>
+                                          </p:stCondLst>
+                                        </p:cTn>
+                                        <p:tgtEl>
+                                          <p:spTgt spid="23"/>
+                                        </p:tgtEl>
+                                        <p:attrNameLst>
+                                          <p:attrName>style.visibility</p:attrName>
+                                        </p:attrNameLst>
+                                      </p:cBhvr>
+                                      <p:to>
+                                        <p:strVal val="visible"/>
+                                      </p:to>
+                                    </p:set>
+                                  </p:childTnLst>
+                                </p:cTn>
+                              </p:par>
+                              <p:par>
+                                <p:cTn id="30" presetID="1" presetClass="entr" presetSubtype="0" fill="hold" grpId="0" nodeType="withEffect">
+                                  <p:stCondLst>
+                                    <p:cond delay="0"/>
+                                  </p:stCondLst>
+                                  <p:childTnLst>
+                                    <p:set>
+                                      <p:cBhvr>
+                                        <p:cTn id="31" dur="1" fill="hold">
+                                          <p:stCondLst>
+                                            <p:cond delay="0"/>
+                                          </p:stCondLst>
+                                        </p:cTn>
+                                        <p:tgtEl>
+                                          <p:spTgt spid="25"/>
+                                        </p:tgtEl>
+                                        <p:attrNameLst>
+                                          <p:attrName>style.visibility</p:attrName>
+                                        </p:attrNameLst>
+                                      </p:cBhvr>
+                                      <p:to>
+                                        <p:strVal val="visible"/>
+                                      </p:to>
+                                    </p:set>
+                                  </p:childTnLst>
+                                </p:cTn>
+                              </p:par>
+                              <p:par>
+                                <p:cTn id="32" presetID="1" presetClass="entr" presetSubtype="0" fill="hold" nodeType="withEffect">
+                                  <p:stCondLst>
+                                    <p:cond delay="0"/>
+                                  </p:stCondLst>
+                                  <p:childTnLst>
+                                    <p:set>
+                                      <p:cBhvr>
+                                        <p:cTn id="33" dur="1" fill="hold">
+                                          <p:stCondLst>
+                                            <p:cond delay="0"/>
+                                          </p:stCondLst>
+                                        </p:cTn>
+                                        <p:tgtEl>
+                                          <p:spTgt spid="28"/>
+                                        </p:tgtEl>
+                                        <p:attrNameLst>
+                                          <p:attrName>style.visibility</p:attrName>
+                                        </p:attrNameLst>
+                                      </p:cBhvr>
+                                      <p:to>
+                                        <p:strVal val="visible"/>
+                                      </p:to>
+                                    </p:set>
+                                  </p:childTnLst>
+                                </p:cTn>
+                              </p:par>
+                              <p:par>
+                                <p:cTn id="34" presetID="1" presetClass="entr" presetSubtype="0" fill="hold" grpId="0" nodeType="withEffect">
+                                  <p:stCondLst>
+                                    <p:cond delay="0"/>
+                                  </p:stCondLst>
+                                  <p:childTnLst>
+                                    <p:set>
+                                      <p:cBhvr>
+                                        <p:cTn id="35" dur="1" fill="hold">
+                                          <p:stCondLst>
+                                            <p:cond delay="0"/>
+                                          </p:stCondLst>
+                                        </p:cTn>
+                                        <p:tgtEl>
+                                          <p:spTgt spid="30"/>
+                                        </p:tgtEl>
+                                        <p:attrNameLst>
+                                          <p:attrName>style.visibility</p:attrName>
+                                        </p:attrNameLst>
+                                      </p:cBhvr>
+                                      <p:to>
+                                        <p:strVal val="visible"/>
+                                      </p:to>
+                                    </p:set>
+                                  </p:childTnLst>
+                                </p:cTn>
+                              </p:par>
+                              <p:par>
+                                <p:cTn id="36" presetID="1" presetClass="entr" presetSubtype="0" fill="hold" grpId="0" nodeType="withEffect">
+                                  <p:stCondLst>
+                                    <p:cond delay="0"/>
+                                  </p:stCondLst>
+                                  <p:childTnLst>
+                                    <p:set>
+                                      <p:cBhvr>
+                                        <p:cTn id="37" dur="1" fill="hold">
+                                          <p:stCondLst>
+                                            <p:cond delay="0"/>
+                                          </p:stCondLst>
+                                        </p:cTn>
+                                        <p:tgtEl>
+                                          <p:spTgt spid="31"/>
+                                        </p:tgtEl>
+                                        <p:attrNameLst>
+                                          <p:attrName>style.visibility</p:attrName>
+                                        </p:attrNameLst>
+                                      </p:cBhvr>
+                                      <p:to>
+                                        <p:strVal val="visible"/>
+                                      </p:to>
+                                    </p:set>
+                                  </p:childTnLst>
+                                </p:cTn>
+                              </p:par>
+                              <p:par>
+                                <p:cTn id="38" presetID="1" presetClass="entr" presetSubtype="0" fill="hold" grpId="0" nodeType="withEffect">
+                                  <p:stCondLst>
+                                    <p:cond delay="0"/>
+                                  </p:stCondLst>
+                                  <p:childTnLst>
+                                    <p:set>
+                                      <p:cBhvr>
+                                        <p:cTn id="39" dur="1" fill="hold">
+                                          <p:stCondLst>
+                                            <p:cond delay="0"/>
+                                          </p:stCondLst>
+                                        </p:cTn>
+                                        <p:tgtEl>
+                                          <p:spTgt spid="32"/>
+                                        </p:tgtEl>
+                                        <p:attrNameLst>
+                                          <p:attrName>style.visibility</p:attrName>
+                                        </p:attrNameLst>
+                                      </p:cBhvr>
+                                      <p:to>
+                                        <p:strVal val="visible"/>
+                                      </p:to>
+                                    </p:set>
+                                  </p:childTnLst>
+                                </p:cTn>
+                              </p:par>
+                              <p:par>
+                                <p:cTn id="40" presetID="1" presetClass="entr" presetSubtype="0" fill="hold" grpId="0" nodeType="withEffect">
+                                  <p:stCondLst>
+                                    <p:cond delay="0"/>
+                                  </p:stCondLst>
+                                  <p:childTnLst>
+                                    <p:set>
+                                      <p:cBhvr>
+                                        <p:cTn id="41" dur="1" fill="hold">
+                                          <p:stCondLst>
+                                            <p:cond delay="0"/>
+                                          </p:stCondLst>
+                                        </p:cTn>
+                                        <p:tgtEl>
+                                          <p:spTgt spid="33"/>
+                                        </p:tgtEl>
+                                        <p:attrNameLst>
+                                          <p:attrName>style.visibility</p:attrName>
+                                        </p:attrNameLst>
+                                      </p:cBhvr>
+                                      <p:to>
+                                        <p:strVal val="visible"/>
+                                      </p:to>
+                                    </p:set>
+                                  </p:childTnLst>
+                                </p:cTn>
+                              </p:par>
+                              <p:par>
+                                <p:cTn id="42" presetID="1" presetClass="entr" presetSubtype="0" fill="hold" grpId="0" nodeType="withEffect">
+                                  <p:stCondLst>
+                                    <p:cond delay="0"/>
+                                  </p:stCondLst>
+                                  <p:childTnLst>
+                                    <p:set>
+                                      <p:cBhvr>
+                                        <p:cTn id="43" dur="1" fill="hold">
+                                          <p:stCondLst>
+                                            <p:cond delay="0"/>
+                                          </p:stCondLst>
+                                        </p:cTn>
+                                        <p:tgtEl>
+                                          <p:spTgt spid="34"/>
+                                        </p:tgtEl>
+                                        <p:attrNameLst>
+                                          <p:attrName>style.visibility</p:attrName>
+                                        </p:attrNameLst>
+                                      </p:cBhvr>
+                                      <p:to>
+                                        <p:strVal val="visible"/>
+                                      </p:to>
+                                    </p:set>
+                                  </p:childTnLst>
+                                </p:cTn>
+                              </p:par>
+                              <p:par>
+                                <p:cTn id="44" presetID="1" presetClass="entr" presetSubtype="0" fill="hold" nodeType="withEffect">
+                                  <p:stCondLst>
+                                    <p:cond delay="0"/>
+                                  </p:stCondLst>
+                                  <p:childTnLst>
+                                    <p:set>
+                                      <p:cBhvr>
+                                        <p:cTn id="45" dur="1" fill="hold">
+                                          <p:stCondLst>
+                                            <p:cond delay="0"/>
+                                          </p:stCondLst>
+                                        </p:cTn>
+                                        <p:tgtEl>
+                                          <p:spTgt spid="36"/>
+                                        </p:tgtEl>
+                                        <p:attrNameLst>
+                                          <p:attrName>style.visibility</p:attrName>
+                                        </p:attrNameLst>
+                                      </p:cBhvr>
+                                      <p:to>
+                                        <p:strVal val="visible"/>
+                                      </p:to>
+                                    </p:set>
+                                  </p:childTnLst>
+                                </p:cTn>
+                              </p:par>
+                            </p:childTnLst>
+                          </p:cTn>
+                        </p:par>
+                      </p:childTnLst>
+                    </p:cTn>
+                  </p:par>
+                </p:childTnLst>
+              </p:cTn>
+              <p:prevCondLst>
+                <p:cond evt="onPrev" delay="0">
+                  <p:tgtEl>
+                    <p:sldTgt/>
+                  </p:tgtEl>
+                </p:cond>
+              </p:prevCondLst>
+              <p:nextCondLst>
+                <p:cond evt="onNext" delay="0">
+                  <p:tgtEl>
+                    <p:sldTgt/>
+                  </p:tgtEl>
+                </p:cond>
+              </p:nextCondLst>
+            </p:seq>
+            <p:audio isNarration="1">
+              <p:cMediaNode vol="80000" showWhenStopped="0">
+                <p:cTn id="46" fill="hold" display="0">
+                  <p:stCondLst>
+                    <p:cond delay="indefinite"/>
+                  </p:stCondLst>
+                  <p:endCondLst>
+                    <p:cond evt="onStopAudio" delay="0">
+                      <p:tgtEl>
+                        <p:sldTgt/>
+                      </p:tgtEl>
+                    </p:cond>
+                  </p:endCondLst>
+                </p:cTn>
+                <p:tgtEl>
+                  <p:spTgt spid="13"/>
+                </p:tgtEl>
+              </p:cMediaNode>
+            </p:audio>
+          </p:childTnLst>
+        </p:cTn>
+      </p:par>
+    </p:tnLst>
+    <p:bldLst>
+      <p:bldP spid="9" grpId="0" animBg="1"/>
+      <p:bldP spid="10" grpId="0" animBg="1"/>
+      <p:bldP spid="16" grpId="0" animBg="1"/>
+      <p:bldP spid="24" grpId="0" animBg="1"/>
+      <p:bldP spid="25" grpId="0" animBg="1"/>
+      <p:bldP spid="29" grpId="0" animBg="1"/>
+      <p:bldP spid="30" grpId="0" animBg="1"/>
+      <p:bldP spid="31" grpId="0" animBg="1"/>
+      <p:bldP spid="32" grpId="0" animBg="1"/>
+      <p:bldP spid="33" grpId="0"/>
+      <p:bldP spid="34" grpId="0"/>
+    </p:bldLst>
+  </p:timing>
 </p:sld>
 </file>
 
@@ -7879,7 +8606,7 @@
           <p:nvPr/>
         </p:nvPicPr>
         <p:blipFill>
-          <a:blip r:embed="rId2">
+          <a:blip r:embed="rId5">
             <a:extLst>
               <a:ext uri="{28A0092B-C50C-407E-A947-70E740481C1C}">
                 <a14:useLocalDpi xmlns:a14="http://schemas.microsoft.com/office/drawing/2010/main" val="0"/>
@@ -7915,7 +8642,7 @@
           <p:nvPr/>
         </p:nvPicPr>
         <p:blipFill>
-          <a:blip r:embed="rId3">
+          <a:blip r:embed="rId6">
             <a:extLst>
               <a:ext uri="{28A0092B-C50C-407E-A947-70E740481C1C}">
                 <a14:useLocalDpi xmlns:a14="http://schemas.microsoft.com/office/drawing/2010/main" val="0"/>
@@ -8517,7 +9244,48 @@
           </a:graphicData>
         </a:graphic>
       </p:graphicFrame>
+      <p:pic>
+        <p:nvPicPr>
+          <p:cNvPr id="13" name="Audio 12">
+            <a:hlinkClick r:id="" action="ppaction://media"/>
+            <a:extLst>
+              <a:ext uri="{FF2B5EF4-FFF2-40B4-BE49-F238E27FC236}">
+                <a16:creationId xmlns:a16="http://schemas.microsoft.com/office/drawing/2014/main" id="{40F70637-E6AF-4C09-8AFB-C0AD6966008C}"/>
+              </a:ext>
+            </a:extLst>
+          </p:cNvPr>
+          <p:cNvPicPr>
+            <a:picLocks noChangeAspect="1"/>
+          </p:cNvPicPr>
+          <p:nvPr>
+            <a:audioFile r:link="rId3"/>
+            <p:extLst>
+              <p:ext uri="{DAA4B4D4-6D71-4841-9C94-3DE7FCFB9230}">
+                <p14:media xmlns:p14="http://schemas.microsoft.com/office/powerpoint/2010/main" r:embed="rId2"/>
+              </p:ext>
+            </p:extLst>
+          </p:nvPr>
+        </p:nvPicPr>
+        <p:blipFill>
+          <a:blip r:embed="rId7"/>
+          <a:stretch>
+            <a:fillRect/>
+          </a:stretch>
+        </p:blipFill>
+        <p:spPr>
+          <a:xfrm>
+            <a:off x="11691938" y="6357938"/>
+            <a:ext cx="347662" cy="347662"/>
+          </a:xfrm>
+          <a:prstGeom prst="rect">
+            <a:avLst/>
+          </a:prstGeom>
+        </p:spPr>
+      </p:pic>
     </p:spTree>
+    <p:custDataLst>
+      <p:tags r:id="rId1"/>
+    </p:custDataLst>
     <p:extLst>
       <p:ext uri="{BB962C8B-B14F-4D97-AF65-F5344CB8AC3E}">
         <p14:creationId xmlns:p14="http://schemas.microsoft.com/office/powerpoint/2010/main" val="2961494060"/>
@@ -8527,6 +9295,433 @@
   <p:clrMapOvr>
     <a:masterClrMapping/>
   </p:clrMapOvr>
+  <mc:AlternateContent xmlns:mc="http://schemas.openxmlformats.org/markup-compatibility/2006">
+    <mc:Choice xmlns:p14="http://schemas.microsoft.com/office/powerpoint/2010/main" Requires="p14">
+      <p:transition spd="slow" p14:dur="2000" advTm="9901"/>
+    </mc:Choice>
+    <mc:Fallback>
+      <p:transition spd="slow" advTm="9901"/>
+    </mc:Fallback>
+  </mc:AlternateContent>
+  <p:timing>
+    <p:tnLst>
+      <p:par>
+        <p:cTn id="1" dur="indefinite" restart="never" nodeType="tmRoot">
+          <p:childTnLst>
+            <p:seq concurrent="1" nextAc="seek">
+              <p:cTn id="2" dur="indefinite" nodeType="mainSeq">
+                <p:childTnLst>
+                  <p:par>
+                    <p:cTn id="3" fill="hold">
+                      <p:stCondLst>
+                        <p:cond delay="indefinite"/>
+                        <p:cond evt="onBegin" delay="0">
+                          <p:tn val="2"/>
+                        </p:cond>
+                      </p:stCondLst>
+                      <p:childTnLst>
+                        <p:par>
+                          <p:cTn id="4" fill="hold">
+                            <p:stCondLst>
+                              <p:cond delay="0"/>
+                            </p:stCondLst>
+                            <p:childTnLst>
+                              <p:par>
+                                <p:cTn id="5" presetID="1" presetClass="mediacall" presetSubtype="0" fill="hold" nodeType="afterEffect">
+                                  <p:stCondLst>
+                                    <p:cond delay="0"/>
+                                  </p:stCondLst>
+                                  <p:childTnLst>
+                                    <p:cmd type="call" cmd="playFrom(0.0)">
+                                      <p:cBhvr>
+                                        <p:cTn id="6" dur="1" fill="hold"/>
+                                        <p:tgtEl>
+                                          <p:spTgt spid="13"/>
+                                        </p:tgtEl>
+                                      </p:cBhvr>
+                                    </p:cmd>
+                                  </p:childTnLst>
+                                </p:cTn>
+                              </p:par>
+                            </p:childTnLst>
+                          </p:cTn>
+                        </p:par>
+                      </p:childTnLst>
+                    </p:cTn>
+                  </p:par>
+                  <p:par>
+                    <p:cTn id="7" fill="hold">
+                      <p:stCondLst>
+                        <p:cond delay="indefinite"/>
+                      </p:stCondLst>
+                      <p:childTnLst>
+                        <p:par>
+                          <p:cTn id="8" fill="hold">
+                            <p:stCondLst>
+                              <p:cond delay="0"/>
+                            </p:stCondLst>
+                            <p:childTnLst>
+                              <p:par>
+                                <p:cTn id="9" presetID="1" presetClass="entr" presetSubtype="0" fill="hold" grpId="0" nodeType="clickEffect">
+                                  <p:stCondLst>
+                                    <p:cond delay="0"/>
+                                  </p:stCondLst>
+                                  <p:childTnLst>
+                                    <p:set>
+                                      <p:cBhvr>
+                                        <p:cTn id="10" dur="1" fill="hold">
+                                          <p:stCondLst>
+                                            <p:cond delay="0"/>
+                                          </p:stCondLst>
+                                        </p:cTn>
+                                        <p:tgtEl>
+                                          <p:spTgt spid="9"/>
+                                        </p:tgtEl>
+                                        <p:attrNameLst>
+                                          <p:attrName>style.visibility</p:attrName>
+                                        </p:attrNameLst>
+                                      </p:cBhvr>
+                                      <p:to>
+                                        <p:strVal val="visible"/>
+                                      </p:to>
+                                    </p:set>
+                                  </p:childTnLst>
+                                </p:cTn>
+                              </p:par>
+                            </p:childTnLst>
+                          </p:cTn>
+                        </p:par>
+                      </p:childTnLst>
+                    </p:cTn>
+                  </p:par>
+                  <p:par>
+                    <p:cTn id="11" fill="hold">
+                      <p:stCondLst>
+                        <p:cond delay="indefinite"/>
+                      </p:stCondLst>
+                      <p:childTnLst>
+                        <p:par>
+                          <p:cTn id="12" fill="hold">
+                            <p:stCondLst>
+                              <p:cond delay="0"/>
+                            </p:stCondLst>
+                            <p:childTnLst>
+                              <p:par>
+                                <p:cTn id="13" presetID="1" presetClass="entr" presetSubtype="0" fill="hold" grpId="0" nodeType="clickEffect">
+                                  <p:stCondLst>
+                                    <p:cond delay="0"/>
+                                  </p:stCondLst>
+                                  <p:childTnLst>
+                                    <p:set>
+                                      <p:cBhvr>
+                                        <p:cTn id="14" dur="1" fill="hold">
+                                          <p:stCondLst>
+                                            <p:cond delay="0"/>
+                                          </p:stCondLst>
+                                        </p:cTn>
+                                        <p:tgtEl>
+                                          <p:spTgt spid="16"/>
+                                        </p:tgtEl>
+                                        <p:attrNameLst>
+                                          <p:attrName>style.visibility</p:attrName>
+                                        </p:attrNameLst>
+                                      </p:cBhvr>
+                                      <p:to>
+                                        <p:strVal val="visible"/>
+                                      </p:to>
+                                    </p:set>
+                                  </p:childTnLst>
+                                </p:cTn>
+                              </p:par>
+                              <p:par>
+                                <p:cTn id="15" presetID="1" presetClass="entr" presetSubtype="0" fill="hold" grpId="0" nodeType="withEffect">
+                                  <p:stCondLst>
+                                    <p:cond delay="0"/>
+                                  </p:stCondLst>
+                                  <p:childTnLst>
+                                    <p:set>
+                                      <p:cBhvr>
+                                        <p:cTn id="16" dur="1" fill="hold">
+                                          <p:stCondLst>
+                                            <p:cond delay="0"/>
+                                          </p:stCondLst>
+                                        </p:cTn>
+                                        <p:tgtEl>
+                                          <p:spTgt spid="29"/>
+                                        </p:tgtEl>
+                                        <p:attrNameLst>
+                                          <p:attrName>style.visibility</p:attrName>
+                                        </p:attrNameLst>
+                                      </p:cBhvr>
+                                      <p:to>
+                                        <p:strVal val="visible"/>
+                                      </p:to>
+                                    </p:set>
+                                  </p:childTnLst>
+                                </p:cTn>
+                              </p:par>
+                              <p:par>
+                                <p:cTn id="17" presetID="1" presetClass="entr" presetSubtype="0" fill="hold" nodeType="withEffect">
+                                  <p:stCondLst>
+                                    <p:cond delay="0"/>
+                                  </p:stCondLst>
+                                  <p:childTnLst>
+                                    <p:set>
+                                      <p:cBhvr>
+                                        <p:cTn id="18" dur="1" fill="hold">
+                                          <p:stCondLst>
+                                            <p:cond delay="0"/>
+                                          </p:stCondLst>
+                                        </p:cTn>
+                                        <p:tgtEl>
+                                          <p:spTgt spid="35"/>
+                                        </p:tgtEl>
+                                        <p:attrNameLst>
+                                          <p:attrName>style.visibility</p:attrName>
+                                        </p:attrNameLst>
+                                      </p:cBhvr>
+                                      <p:to>
+                                        <p:strVal val="visible"/>
+                                      </p:to>
+                                    </p:set>
+                                  </p:childTnLst>
+                                </p:cTn>
+                              </p:par>
+                            </p:childTnLst>
+                          </p:cTn>
+                        </p:par>
+                      </p:childTnLst>
+                    </p:cTn>
+                  </p:par>
+                  <p:par>
+                    <p:cTn id="19" fill="hold">
+                      <p:stCondLst>
+                        <p:cond delay="indefinite"/>
+                      </p:stCondLst>
+                      <p:childTnLst>
+                        <p:par>
+                          <p:cTn id="20" fill="hold">
+                            <p:stCondLst>
+                              <p:cond delay="0"/>
+                            </p:stCondLst>
+                            <p:childTnLst>
+                              <p:par>
+                                <p:cTn id="21" presetID="1" presetClass="entr" presetSubtype="0" fill="hold" grpId="0" nodeType="clickEffect">
+                                  <p:stCondLst>
+                                    <p:cond delay="0"/>
+                                  </p:stCondLst>
+                                  <p:childTnLst>
+                                    <p:set>
+                                      <p:cBhvr>
+                                        <p:cTn id="22" dur="1" fill="hold">
+                                          <p:stCondLst>
+                                            <p:cond delay="0"/>
+                                          </p:stCondLst>
+                                        </p:cTn>
+                                        <p:tgtEl>
+                                          <p:spTgt spid="10"/>
+                                        </p:tgtEl>
+                                        <p:attrNameLst>
+                                          <p:attrName>style.visibility</p:attrName>
+                                        </p:attrNameLst>
+                                      </p:cBhvr>
+                                      <p:to>
+                                        <p:strVal val="visible"/>
+                                      </p:to>
+                                    </p:set>
+                                  </p:childTnLst>
+                                </p:cTn>
+                              </p:par>
+                              <p:par>
+                                <p:cTn id="23" presetID="1" presetClass="entr" presetSubtype="0" fill="hold" grpId="0" nodeType="withEffect">
+                                  <p:stCondLst>
+                                    <p:cond delay="0"/>
+                                  </p:stCondLst>
+                                  <p:childTnLst>
+                                    <p:set>
+                                      <p:cBhvr>
+                                        <p:cTn id="24" dur="1" fill="hold">
+                                          <p:stCondLst>
+                                            <p:cond delay="0"/>
+                                          </p:stCondLst>
+                                        </p:cTn>
+                                        <p:tgtEl>
+                                          <p:spTgt spid="24"/>
+                                        </p:tgtEl>
+                                        <p:attrNameLst>
+                                          <p:attrName>style.visibility</p:attrName>
+                                        </p:attrNameLst>
+                                      </p:cBhvr>
+                                      <p:to>
+                                        <p:strVal val="visible"/>
+                                      </p:to>
+                                    </p:set>
+                                  </p:childTnLst>
+                                </p:cTn>
+                              </p:par>
+                              <p:par>
+                                <p:cTn id="25" presetID="1" presetClass="entr" presetSubtype="0" fill="hold" nodeType="withEffect">
+                                  <p:stCondLst>
+                                    <p:cond delay="0"/>
+                                  </p:stCondLst>
+                                  <p:childTnLst>
+                                    <p:set>
+                                      <p:cBhvr>
+                                        <p:cTn id="26" dur="1" fill="hold">
+                                          <p:stCondLst>
+                                            <p:cond delay="0"/>
+                                          </p:stCondLst>
+                                        </p:cTn>
+                                        <p:tgtEl>
+                                          <p:spTgt spid="8"/>
+                                        </p:tgtEl>
+                                        <p:attrNameLst>
+                                          <p:attrName>style.visibility</p:attrName>
+                                        </p:attrNameLst>
+                                      </p:cBhvr>
+                                      <p:to>
+                                        <p:strVal val="visible"/>
+                                      </p:to>
+                                    </p:set>
+                                  </p:childTnLst>
+                                </p:cTn>
+                              </p:par>
+                              <p:par>
+                                <p:cTn id="27" presetID="1" presetClass="entr" presetSubtype="0" fill="hold" grpId="0" nodeType="withEffect">
+                                  <p:stCondLst>
+                                    <p:cond delay="0"/>
+                                  </p:stCondLst>
+                                  <p:childTnLst>
+                                    <p:set>
+                                      <p:cBhvr>
+                                        <p:cTn id="28" dur="1" fill="hold">
+                                          <p:stCondLst>
+                                            <p:cond delay="0"/>
+                                          </p:stCondLst>
+                                        </p:cTn>
+                                        <p:tgtEl>
+                                          <p:spTgt spid="25"/>
+                                        </p:tgtEl>
+                                        <p:attrNameLst>
+                                          <p:attrName>style.visibility</p:attrName>
+                                        </p:attrNameLst>
+                                      </p:cBhvr>
+                                      <p:to>
+                                        <p:strVal val="visible"/>
+                                      </p:to>
+                                    </p:set>
+                                  </p:childTnLst>
+                                </p:cTn>
+                              </p:par>
+                              <p:par>
+                                <p:cTn id="29" presetID="1" presetClass="entr" presetSubtype="0" fill="hold" nodeType="withEffect">
+                                  <p:stCondLst>
+                                    <p:cond delay="0"/>
+                                  </p:stCondLst>
+                                  <p:childTnLst>
+                                    <p:set>
+                                      <p:cBhvr>
+                                        <p:cTn id="30" dur="1" fill="hold">
+                                          <p:stCondLst>
+                                            <p:cond delay="0"/>
+                                          </p:stCondLst>
+                                        </p:cTn>
+                                        <p:tgtEl>
+                                          <p:spTgt spid="11"/>
+                                        </p:tgtEl>
+                                        <p:attrNameLst>
+                                          <p:attrName>style.visibility</p:attrName>
+                                        </p:attrNameLst>
+                                      </p:cBhvr>
+                                      <p:to>
+                                        <p:strVal val="visible"/>
+                                      </p:to>
+                                    </p:set>
+                                  </p:childTnLst>
+                                </p:cTn>
+                              </p:par>
+                              <p:par>
+                                <p:cTn id="31" presetID="1" presetClass="entr" presetSubtype="0" fill="hold" nodeType="withEffect">
+                                  <p:stCondLst>
+                                    <p:cond delay="0"/>
+                                  </p:stCondLst>
+                                  <p:childTnLst>
+                                    <p:set>
+                                      <p:cBhvr>
+                                        <p:cTn id="32" dur="1" fill="hold">
+                                          <p:stCondLst>
+                                            <p:cond delay="0"/>
+                                          </p:stCondLst>
+                                        </p:cTn>
+                                        <p:tgtEl>
+                                          <p:spTgt spid="23"/>
+                                        </p:tgtEl>
+                                        <p:attrNameLst>
+                                          <p:attrName>style.visibility</p:attrName>
+                                        </p:attrNameLst>
+                                      </p:cBhvr>
+                                      <p:to>
+                                        <p:strVal val="visible"/>
+                                      </p:to>
+                                    </p:set>
+                                  </p:childTnLst>
+                                </p:cTn>
+                              </p:par>
+                            </p:childTnLst>
+                          </p:cTn>
+                        </p:par>
+                      </p:childTnLst>
+                    </p:cTn>
+                  </p:par>
+                </p:childTnLst>
+              </p:cTn>
+              <p:prevCondLst>
+                <p:cond evt="onPrev" delay="0">
+                  <p:tgtEl>
+                    <p:sldTgt/>
+                  </p:tgtEl>
+                </p:cond>
+              </p:prevCondLst>
+              <p:nextCondLst>
+                <p:cond evt="onNext" delay="0">
+                  <p:tgtEl>
+                    <p:sldTgt/>
+                  </p:tgtEl>
+                </p:cond>
+              </p:nextCondLst>
+            </p:seq>
+            <p:audio isNarration="1">
+              <p:cMediaNode vol="80000" showWhenStopped="0">
+                <p:cTn id="33" fill="hold" display="0">
+                  <p:stCondLst>
+                    <p:cond delay="indefinite"/>
+                  </p:stCondLst>
+                  <p:endCondLst>
+                    <p:cond evt="onStopAudio" delay="0">
+                      <p:tgtEl>
+                        <p:sldTgt/>
+                      </p:tgtEl>
+                    </p:cond>
+                  </p:endCondLst>
+                </p:cTn>
+                <p:tgtEl>
+                  <p:spTgt spid="13"/>
+                </p:tgtEl>
+              </p:cMediaNode>
+            </p:audio>
+          </p:childTnLst>
+        </p:cTn>
+      </p:par>
+    </p:tnLst>
+    <p:bldLst>
+      <p:bldP spid="9" grpId="0" animBg="1"/>
+      <p:bldP spid="10" grpId="0" animBg="1"/>
+      <p:bldP spid="16" grpId="0" animBg="1"/>
+      <p:bldP spid="24" grpId="0" animBg="1"/>
+      <p:bldP spid="25" grpId="0" animBg="1"/>
+      <p:bldP spid="29" grpId="0" animBg="1"/>
+    </p:bldLst>
+  </p:timing>
 </p:sld>
 </file>
 
@@ -8971,12 +10166,12 @@
                     <a:p>
                       <a:pPr algn="l" fontAlgn="ctr"/>
                       <a:r>
-                        <a:rPr lang="en-US" sz="1600" u="none" strike="noStrike">
+                        <a:rPr lang="en-US" sz="1600" u="none" strike="noStrike" dirty="0">
                           <a:effectLst/>
                         </a:rPr>
                         <a:t>Focal Length</a:t>
                       </a:r>
-                      <a:endParaRPr lang="en-US" sz="1600" b="0" i="0" u="none" strike="noStrike">
+                      <a:endParaRPr lang="en-US" sz="1600" b="0" i="0" u="none" strike="noStrike" dirty="0">
                         <a:solidFill>
                           <a:srgbClr val="FFFFFF"/>
                         </a:solidFill>
@@ -9836,7 +11031,48 @@
           </a:p>
         </p:txBody>
       </p:sp>
+      <p:pic>
+        <p:nvPicPr>
+          <p:cNvPr id="8" name="Audio 7">
+            <a:hlinkClick r:id="" action="ppaction://media"/>
+            <a:extLst>
+              <a:ext uri="{FF2B5EF4-FFF2-40B4-BE49-F238E27FC236}">
+                <a16:creationId xmlns:a16="http://schemas.microsoft.com/office/drawing/2014/main" id="{8D6DAE88-752F-440E-8A62-43B686BBA8FE}"/>
+              </a:ext>
+            </a:extLst>
+          </p:cNvPr>
+          <p:cNvPicPr>
+            <a:picLocks noChangeAspect="1"/>
+          </p:cNvPicPr>
+          <p:nvPr>
+            <a:audioFile r:link="rId3"/>
+            <p:extLst>
+              <p:ext uri="{DAA4B4D4-6D71-4841-9C94-3DE7FCFB9230}">
+                <p14:media xmlns:p14="http://schemas.microsoft.com/office/powerpoint/2010/main" r:embed="rId2"/>
+              </p:ext>
+            </p:extLst>
+          </p:nvPr>
+        </p:nvPicPr>
+        <p:blipFill>
+          <a:blip r:embed="rId5"/>
+          <a:stretch>
+            <a:fillRect/>
+          </a:stretch>
+        </p:blipFill>
+        <p:spPr>
+          <a:xfrm>
+            <a:off x="11691938" y="6357938"/>
+            <a:ext cx="347662" cy="347662"/>
+          </a:xfrm>
+          <a:prstGeom prst="rect">
+            <a:avLst/>
+          </a:prstGeom>
+        </p:spPr>
+      </p:pic>
     </p:spTree>
+    <p:custDataLst>
+      <p:tags r:id="rId1"/>
+    </p:custDataLst>
     <p:extLst>
       <p:ext uri="{BB962C8B-B14F-4D97-AF65-F5344CB8AC3E}">
         <p14:creationId xmlns:p14="http://schemas.microsoft.com/office/powerpoint/2010/main" val="1757984332"/>
@@ -9846,12 +11082,356 @@
   <p:clrMapOvr>
     <a:masterClrMapping/>
   </p:clrMapOvr>
+  <mc:AlternateContent xmlns:mc="http://schemas.openxmlformats.org/markup-compatibility/2006">
+    <mc:Choice xmlns:p14="http://schemas.microsoft.com/office/powerpoint/2010/main" Requires="p14">
+      <p:transition spd="slow" p14:dur="2000" advTm="22702"/>
+    </mc:Choice>
+    <mc:Fallback>
+      <p:transition spd="slow" advTm="22702"/>
+    </mc:Fallback>
+  </mc:AlternateContent>
+  <p:timing>
+    <p:tnLst>
+      <p:par>
+        <p:cTn id="1" dur="indefinite" restart="never" nodeType="tmRoot">
+          <p:childTnLst>
+            <p:seq concurrent="1" nextAc="seek">
+              <p:cTn id="2" dur="indefinite" nodeType="mainSeq">
+                <p:childTnLst>
+                  <p:par>
+                    <p:cTn id="3" fill="hold">
+                      <p:stCondLst>
+                        <p:cond delay="indefinite"/>
+                        <p:cond evt="onBegin" delay="0">
+                          <p:tn val="2"/>
+                        </p:cond>
+                      </p:stCondLst>
+                      <p:childTnLst>
+                        <p:par>
+                          <p:cTn id="4" fill="hold">
+                            <p:stCondLst>
+                              <p:cond delay="0"/>
+                            </p:stCondLst>
+                            <p:childTnLst>
+                              <p:par>
+                                <p:cTn id="5" presetID="1" presetClass="mediacall" presetSubtype="0" fill="hold" nodeType="afterEffect">
+                                  <p:stCondLst>
+                                    <p:cond delay="0"/>
+                                  </p:stCondLst>
+                                  <p:childTnLst>
+                                    <p:cmd type="call" cmd="playFrom(0.0)">
+                                      <p:cBhvr>
+                                        <p:cTn id="6" dur="1" fill="hold"/>
+                                        <p:tgtEl>
+                                          <p:spTgt spid="8"/>
+                                        </p:tgtEl>
+                                      </p:cBhvr>
+                                    </p:cmd>
+                                  </p:childTnLst>
+                                </p:cTn>
+                              </p:par>
+                            </p:childTnLst>
+                          </p:cTn>
+                        </p:par>
+                      </p:childTnLst>
+                    </p:cTn>
+                  </p:par>
+                  <p:par>
+                    <p:cTn id="7" fill="hold">
+                      <p:stCondLst>
+                        <p:cond delay="indefinite"/>
+                      </p:stCondLst>
+                      <p:childTnLst>
+                        <p:par>
+                          <p:cTn id="8" fill="hold">
+                            <p:stCondLst>
+                              <p:cond delay="0"/>
+                            </p:stCondLst>
+                            <p:childTnLst>
+                              <p:par>
+                                <p:cTn id="9" presetID="1" presetClass="entr" presetSubtype="0" fill="hold" nodeType="clickEffect">
+                                  <p:stCondLst>
+                                    <p:cond delay="0"/>
+                                  </p:stCondLst>
+                                  <p:childTnLst>
+                                    <p:set>
+                                      <p:cBhvr>
+                                        <p:cTn id="10" dur="1" fill="hold">
+                                          <p:stCondLst>
+                                            <p:cond delay="0"/>
+                                          </p:stCondLst>
+                                        </p:cTn>
+                                        <p:tgtEl>
+                                          <p:spTgt spid="3"/>
+                                        </p:tgtEl>
+                                        <p:attrNameLst>
+                                          <p:attrName>style.visibility</p:attrName>
+                                        </p:attrNameLst>
+                                      </p:cBhvr>
+                                      <p:to>
+                                        <p:strVal val="visible"/>
+                                      </p:to>
+                                    </p:set>
+                                  </p:childTnLst>
+                                </p:cTn>
+                              </p:par>
+                            </p:childTnLst>
+                          </p:cTn>
+                        </p:par>
+                      </p:childTnLst>
+                    </p:cTn>
+                  </p:par>
+                  <p:par>
+                    <p:cTn id="11" fill="hold">
+                      <p:stCondLst>
+                        <p:cond delay="indefinite"/>
+                      </p:stCondLst>
+                      <p:childTnLst>
+                        <p:par>
+                          <p:cTn id="12" fill="hold">
+                            <p:stCondLst>
+                              <p:cond delay="0"/>
+                            </p:stCondLst>
+                            <p:childTnLst>
+                              <p:par>
+                                <p:cTn id="13" presetID="1" presetClass="entr" presetSubtype="0" fill="hold" grpId="0" nodeType="clickEffect">
+                                  <p:stCondLst>
+                                    <p:cond delay="0"/>
+                                  </p:stCondLst>
+                                  <p:childTnLst>
+                                    <p:set>
+                                      <p:cBhvr>
+                                        <p:cTn id="14" dur="1" fill="hold">
+                                          <p:stCondLst>
+                                            <p:cond delay="0"/>
+                                          </p:stCondLst>
+                                        </p:cTn>
+                                        <p:tgtEl>
+                                          <p:spTgt spid="9"/>
+                                        </p:tgtEl>
+                                        <p:attrNameLst>
+                                          <p:attrName>style.visibility</p:attrName>
+                                        </p:attrNameLst>
+                                      </p:cBhvr>
+                                      <p:to>
+                                        <p:strVal val="visible"/>
+                                      </p:to>
+                                    </p:set>
+                                  </p:childTnLst>
+                                </p:cTn>
+                              </p:par>
+                            </p:childTnLst>
+                          </p:cTn>
+                        </p:par>
+                      </p:childTnLst>
+                    </p:cTn>
+                  </p:par>
+                  <p:par>
+                    <p:cTn id="15" fill="hold">
+                      <p:stCondLst>
+                        <p:cond delay="indefinite"/>
+                      </p:stCondLst>
+                      <p:childTnLst>
+                        <p:par>
+                          <p:cTn id="16" fill="hold">
+                            <p:stCondLst>
+                              <p:cond delay="0"/>
+                            </p:stCondLst>
+                            <p:childTnLst>
+                              <p:par>
+                                <p:cTn id="17" presetID="1" presetClass="entr" presetSubtype="0" fill="hold" grpId="0" nodeType="clickEffect">
+                                  <p:stCondLst>
+                                    <p:cond delay="0"/>
+                                  </p:stCondLst>
+                                  <p:childTnLst>
+                                    <p:set>
+                                      <p:cBhvr>
+                                        <p:cTn id="18" dur="1" fill="hold">
+                                          <p:stCondLst>
+                                            <p:cond delay="0"/>
+                                          </p:stCondLst>
+                                        </p:cTn>
+                                        <p:tgtEl>
+                                          <p:spTgt spid="16"/>
+                                        </p:tgtEl>
+                                        <p:attrNameLst>
+                                          <p:attrName>style.visibility</p:attrName>
+                                        </p:attrNameLst>
+                                      </p:cBhvr>
+                                      <p:to>
+                                        <p:strVal val="visible"/>
+                                      </p:to>
+                                    </p:set>
+                                  </p:childTnLst>
+                                </p:cTn>
+                              </p:par>
+                            </p:childTnLst>
+                          </p:cTn>
+                        </p:par>
+                      </p:childTnLst>
+                    </p:cTn>
+                  </p:par>
+                  <p:par>
+                    <p:cTn id="19" fill="hold">
+                      <p:stCondLst>
+                        <p:cond delay="indefinite"/>
+                      </p:stCondLst>
+                      <p:childTnLst>
+                        <p:par>
+                          <p:cTn id="20" fill="hold">
+                            <p:stCondLst>
+                              <p:cond delay="0"/>
+                            </p:stCondLst>
+                            <p:childTnLst>
+                              <p:par>
+                                <p:cTn id="21" presetID="1" presetClass="entr" presetSubtype="0" fill="hold" grpId="0" nodeType="clickEffect">
+                                  <p:stCondLst>
+                                    <p:cond delay="0"/>
+                                  </p:stCondLst>
+                                  <p:childTnLst>
+                                    <p:set>
+                                      <p:cBhvr>
+                                        <p:cTn id="22" dur="1" fill="hold">
+                                          <p:stCondLst>
+                                            <p:cond delay="0"/>
+                                          </p:stCondLst>
+                                        </p:cTn>
+                                        <p:tgtEl>
+                                          <p:spTgt spid="29"/>
+                                        </p:tgtEl>
+                                        <p:attrNameLst>
+                                          <p:attrName>style.visibility</p:attrName>
+                                        </p:attrNameLst>
+                                      </p:cBhvr>
+                                      <p:to>
+                                        <p:strVal val="visible"/>
+                                      </p:to>
+                                    </p:set>
+                                  </p:childTnLst>
+                                </p:cTn>
+                              </p:par>
+                            </p:childTnLst>
+                          </p:cTn>
+                        </p:par>
+                      </p:childTnLst>
+                    </p:cTn>
+                  </p:par>
+                  <p:par>
+                    <p:cTn id="23" fill="hold">
+                      <p:stCondLst>
+                        <p:cond delay="indefinite"/>
+                      </p:stCondLst>
+                      <p:childTnLst>
+                        <p:par>
+                          <p:cTn id="24" fill="hold">
+                            <p:stCondLst>
+                              <p:cond delay="0"/>
+                            </p:stCondLst>
+                            <p:childTnLst>
+                              <p:par>
+                                <p:cTn id="25" presetID="1" presetClass="entr" presetSubtype="0" fill="hold" grpId="0" nodeType="clickEffect">
+                                  <p:stCondLst>
+                                    <p:cond delay="0"/>
+                                  </p:stCondLst>
+                                  <p:childTnLst>
+                                    <p:set>
+                                      <p:cBhvr>
+                                        <p:cTn id="26" dur="1" fill="hold">
+                                          <p:stCondLst>
+                                            <p:cond delay="0"/>
+                                          </p:stCondLst>
+                                        </p:cTn>
+                                        <p:tgtEl>
+                                          <p:spTgt spid="21"/>
+                                        </p:tgtEl>
+                                        <p:attrNameLst>
+                                          <p:attrName>style.visibility</p:attrName>
+                                        </p:attrNameLst>
+                                      </p:cBhvr>
+                                      <p:to>
+                                        <p:strVal val="visible"/>
+                                      </p:to>
+                                    </p:set>
+                                  </p:childTnLst>
+                                </p:cTn>
+                              </p:par>
+                            </p:childTnLst>
+                          </p:cTn>
+                        </p:par>
+                      </p:childTnLst>
+                    </p:cTn>
+                  </p:par>
+                </p:childTnLst>
+              </p:cTn>
+              <p:prevCondLst>
+                <p:cond evt="onPrev" delay="0">
+                  <p:tgtEl>
+                    <p:sldTgt/>
+                  </p:tgtEl>
+                </p:cond>
+              </p:prevCondLst>
+              <p:nextCondLst>
+                <p:cond evt="onNext" delay="0">
+                  <p:tgtEl>
+                    <p:sldTgt/>
+                  </p:tgtEl>
+                </p:cond>
+              </p:nextCondLst>
+            </p:seq>
+            <p:audio isNarration="1">
+              <p:cMediaNode vol="80000" showWhenStopped="0">
+                <p:cTn id="27" fill="hold" display="0">
+                  <p:stCondLst>
+                    <p:cond delay="indefinite"/>
+                  </p:stCondLst>
+                  <p:endCondLst>
+                    <p:cond evt="onStopAudio" delay="0">
+                      <p:tgtEl>
+                        <p:sldTgt/>
+                      </p:tgtEl>
+                    </p:cond>
+                  </p:endCondLst>
+                </p:cTn>
+                <p:tgtEl>
+                  <p:spTgt spid="8"/>
+                </p:tgtEl>
+              </p:cMediaNode>
+            </p:audio>
+          </p:childTnLst>
+        </p:cTn>
+      </p:par>
+    </p:tnLst>
+    <p:bldLst>
+      <p:bldP spid="9" grpId="0" animBg="1"/>
+      <p:bldP spid="16" grpId="0" animBg="1"/>
+      <p:bldP spid="29" grpId="0" animBg="1"/>
+      <p:bldP spid="21" grpId="0" animBg="1"/>
+    </p:bldLst>
+  </p:timing>
 </p:sld>
 </file>
 
 <file path=ppt/tags/tag1.xml><?xml version="1.0" encoding="utf-8"?>
 <p:tagLst xmlns:a="http://schemas.openxmlformats.org/drawingml/2006/main" xmlns:r="http://schemas.openxmlformats.org/officeDocument/2006/relationships" xmlns:p="http://schemas.openxmlformats.org/presentationml/2006/main">
-  <p:tag name="TIMING" val="|16.8|10.9|9.6"/>
+  <p:tag name="TIMING" val="|0.9|4.5|9.3|10.2|12.1"/>
+</p:tagLst>
+</file>
+
+<file path=ppt/tags/tag2.xml><?xml version="1.0" encoding="utf-8"?>
+<p:tagLst xmlns:a="http://schemas.openxmlformats.org/drawingml/2006/main" xmlns:r="http://schemas.openxmlformats.org/officeDocument/2006/relationships" xmlns:p="http://schemas.openxmlformats.org/presentationml/2006/main">
+  <p:tag name="TIMING" val="|3.8|4.7|1.2|0.4"/>
+</p:tagLst>
+</file>
+
+<file path=ppt/tags/tag3.xml><?xml version="1.0" encoding="utf-8"?>
+<p:tagLst xmlns:a="http://schemas.openxmlformats.org/drawingml/2006/main" xmlns:r="http://schemas.openxmlformats.org/officeDocument/2006/relationships" xmlns:p="http://schemas.openxmlformats.org/presentationml/2006/main">
+  <p:tag name="TIMING" val="|0.5|1.7|1.5"/>
+</p:tagLst>
+</file>
+
+<file path=ppt/tags/tag4.xml><?xml version="1.0" encoding="utf-8"?>
+<p:tagLst xmlns:a="http://schemas.openxmlformats.org/drawingml/2006/main" xmlns:r="http://schemas.openxmlformats.org/officeDocument/2006/relationships" xmlns:p="http://schemas.openxmlformats.org/presentationml/2006/main">
+  <p:tag name="TIMING" val="|0.2|1|2.9|2.2|4.6"/>
 </p:tagLst>
 </file>
 

</xml_diff>